<commit_message>
Added sounds to main and end and made some other edits
</commit_message>
<xml_diff>
--- a/Sprint Reports/Presentation Report 1.pptx
+++ b/Sprint Reports/Presentation Report 1.pptx
@@ -106,6 +106,22 @@
       </a:defRPr>
     </a:lvl9pPr>
   </p:defaultTextStyle>
+  <p:extLst>
+    <p:ext uri="{EFAFB233-063F-42B5-8137-9DF3F51BA10A}">
+      <p15:sldGuideLst xmlns:p15="http://schemas.microsoft.com/office/powerpoint/2012/main">
+        <p15:guide id="1" orient="horz" pos="2160">
+          <p15:clr>
+            <a:srgbClr val="A4A3A4"/>
+          </p15:clr>
+        </p15:guide>
+        <p15:guide id="2" pos="2880">
+          <p15:clr>
+            <a:srgbClr val="A4A3A4"/>
+          </p15:clr>
+        </p15:guide>
+      </p15:sldGuideLst>
+    </p:ext>
+  </p:extLst>
 </p:presentation>
 </file>
 
@@ -3197,30 +3213,6 @@
           </a:p>
         </p:txBody>
       </p:sp>
-      <p:sp>
-        <p:nvSpPr>
-          <p:cNvPr id="5" name="Title 4"/>
-          <p:cNvSpPr>
-            <a:spLocks noGrp="1"/>
-          </p:cNvSpPr>
-          <p:nvPr>
-            <p:ph type="ctrTitle"/>
-          </p:nvPr>
-        </p:nvSpPr>
-        <p:spPr>
-          <a:xfrm>
-            <a:off x="1066800" y="5105400"/>
-            <a:ext cx="7772400" cy="1470025"/>
-          </a:xfrm>
-        </p:spPr>
-        <p:txBody>
-          <a:bodyPr/>
-          <a:lstStyle/>
-          <a:p>
-            <a:endParaRPr lang="en-US" dirty="0"/>
-          </a:p>
-        </p:txBody>
-      </p:sp>
     </p:spTree>
     <p:extLst>
       <p:ext uri="{BB962C8B-B14F-4D97-AF65-F5344CB8AC3E}">
@@ -3231,6 +3223,13 @@
   <p:clrMapOvr>
     <a:masterClrMapping/>
   </p:clrMapOvr>
+  <p:timing>
+    <p:tnLst>
+      <p:par>
+        <p:cTn id="1" dur="indefinite" restart="never" nodeType="tmRoot"/>
+      </p:par>
+    </p:tnLst>
+  </p:timing>
 </p:sld>
 </file>
 
@@ -3309,12 +3308,12 @@
           <a:lstStyle/>
           <a:p>
             <a:r>
-              <a:rPr lang="en-US" sz="2500" dirty="0" smtClean="0">
+              <a:rPr lang="en-US" sz="2100" dirty="0" smtClean="0">
                 <a:solidFill>
                   <a:schemeClr val="bg1"/>
                 </a:solidFill>
               </a:rPr>
-              <a:t>4 Players</a:t>
+              <a:t>4 Player Local Multiplayer</a:t>
             </a:r>
           </a:p>
           <a:p>
@@ -3329,58 +3328,158 @@
             </a:r>
           </a:p>
           <a:p>
-            <a:r>
-              <a:rPr lang="en-US" sz="2500" dirty="0" smtClean="0">
+            <a:pPr lvl="1"/>
+            <a:r>
+              <a:rPr lang="en-US" sz="2100" dirty="0" smtClean="0">
                 <a:solidFill>
                   <a:schemeClr val="bg1"/>
                 </a:solidFill>
               </a:rPr>
-              <a:t>Four power ups</a:t>
+              <a:t>Preparing for networking milestones.</a:t>
+            </a:r>
+          </a:p>
+          <a:p>
+            <a:r>
+              <a:rPr lang="en-US" sz="2100" dirty="0">
+                <a:solidFill>
+                  <a:schemeClr val="bg1"/>
+                </a:solidFill>
+              </a:rPr>
+              <a:t>Win/Lose </a:t>
+            </a:r>
+            <a:r>
+              <a:rPr lang="en-US" sz="2100" dirty="0" smtClean="0">
+                <a:solidFill>
+                  <a:schemeClr val="bg1"/>
+                </a:solidFill>
+              </a:rPr>
+              <a:t>Condition</a:t>
             </a:r>
           </a:p>
           <a:p>
             <a:pPr lvl="1"/>
             <a:r>
-              <a:rPr lang="en-US" sz="2500" dirty="0" smtClean="0">
+              <a:rPr lang="en-US" sz="2100" dirty="0" smtClean="0">
                 <a:solidFill>
                   <a:schemeClr val="bg1"/>
                 </a:solidFill>
               </a:rPr>
-              <a:t>Bomb Count</a:t>
-            </a:r>
+              <a:t>Drop bombs to sabotage other players.</a:t>
+            </a:r>
+            <a:endParaRPr lang="en-US" sz="2100" dirty="0">
+              <a:solidFill>
+                <a:schemeClr val="bg1"/>
+              </a:solidFill>
+            </a:endParaRPr>
           </a:p>
           <a:p>
             <a:pPr lvl="1"/>
             <a:r>
-              <a:rPr lang="en-US" sz="2500" dirty="0" smtClean="0">
+              <a:rPr lang="en-US" sz="2100" dirty="0">
                 <a:solidFill>
                   <a:schemeClr val="bg1"/>
                 </a:solidFill>
               </a:rPr>
-              <a:t>Explosion Size</a:t>
+              <a:t>Last </a:t>
+            </a:r>
+            <a:r>
+              <a:rPr lang="en-US" sz="2100" dirty="0" smtClean="0">
+                <a:solidFill>
+                  <a:schemeClr val="bg1"/>
+                </a:solidFill>
+              </a:rPr>
+              <a:t>person standing.</a:t>
+            </a:r>
+            <a:endParaRPr lang="en-US" sz="2100" dirty="0" smtClean="0">
+              <a:solidFill>
+                <a:schemeClr val="bg1"/>
+              </a:solidFill>
+            </a:endParaRPr>
+          </a:p>
+          <a:p>
+            <a:r>
+              <a:rPr lang="en-US" sz="2100" dirty="0" smtClean="0">
+                <a:solidFill>
+                  <a:schemeClr val="bg1"/>
+                </a:solidFill>
+              </a:rPr>
+              <a:t>Four </a:t>
+            </a:r>
+            <a:r>
+              <a:rPr lang="en-US" sz="2100" dirty="0" smtClean="0">
+                <a:solidFill>
+                  <a:schemeClr val="bg1"/>
+                </a:solidFill>
+              </a:rPr>
+              <a:t>power </a:t>
+            </a:r>
+            <a:r>
+              <a:rPr lang="en-US" sz="2100" dirty="0" smtClean="0">
+                <a:solidFill>
+                  <a:schemeClr val="bg1"/>
+                </a:solidFill>
+              </a:rPr>
+              <a:t>ups</a:t>
             </a:r>
           </a:p>
           <a:p>
             <a:pPr lvl="1"/>
             <a:r>
-              <a:rPr lang="en-US" sz="2500" dirty="0" smtClean="0">
+              <a:rPr lang="en-US" sz="2100" dirty="0" smtClean="0">
                 <a:solidFill>
                   <a:schemeClr val="bg1"/>
                 </a:solidFill>
               </a:rPr>
-              <a:t>Invulnerability</a:t>
-            </a:r>
+              <a:t>Speed Up (Lightning Bolt)</a:t>
+            </a:r>
+            <a:endParaRPr lang="en-US" sz="2100" dirty="0" smtClean="0">
+              <a:solidFill>
+                <a:schemeClr val="bg1"/>
+              </a:solidFill>
+            </a:endParaRPr>
           </a:p>
           <a:p>
             <a:pPr lvl="1"/>
             <a:r>
-              <a:rPr lang="en-US" sz="2500" dirty="0" smtClean="0">
+              <a:rPr lang="en-US" sz="2100" dirty="0" smtClean="0">
                 <a:solidFill>
                   <a:schemeClr val="bg1"/>
                 </a:solidFill>
               </a:rPr>
-              <a:t>Speed up</a:t>
-            </a:r>
+              <a:t>Bomb Count (White Bomb)</a:t>
+            </a:r>
+          </a:p>
+          <a:p>
+            <a:pPr lvl="1"/>
+            <a:r>
+              <a:rPr lang="en-US" sz="2100" dirty="0" smtClean="0">
+                <a:solidFill>
+                  <a:schemeClr val="bg1"/>
+                </a:solidFill>
+              </a:rPr>
+              <a:t>Explosion Size (Green +1)</a:t>
+            </a:r>
+            <a:endParaRPr lang="en-US" sz="2100" dirty="0" smtClean="0">
+              <a:solidFill>
+                <a:schemeClr val="bg1"/>
+              </a:solidFill>
+            </a:endParaRPr>
+          </a:p>
+          <a:p>
+            <a:pPr lvl="1"/>
+            <a:r>
+              <a:rPr lang="en-US" sz="2100" dirty="0" smtClean="0">
+                <a:solidFill>
+                  <a:schemeClr val="bg1"/>
+                </a:solidFill>
+              </a:rPr>
+              <a:t>Invulnerability (Blue Shield)</a:t>
+            </a:r>
+            <a:endParaRPr lang="en-US" sz="2100" dirty="0" smtClean="0">
+              <a:solidFill>
+                <a:schemeClr val="bg1"/>
+              </a:solidFill>
+            </a:endParaRPr>
           </a:p>
         </p:txBody>
       </p:sp>
@@ -3407,7 +3506,7 @@
         </p:blipFill>
         <p:spPr bwMode="auto">
           <a:xfrm>
-            <a:off x="5257800" y="1828800"/>
+            <a:off x="5638800" y="1676400"/>
             <a:ext cx="2933700" cy="3033713"/>
           </a:xfrm>
           <a:prstGeom prst="rect">
@@ -3448,6 +3547,13 @@
   <p:clrMapOvr>
     <a:masterClrMapping/>
   </p:clrMapOvr>
+  <p:timing>
+    <p:tnLst>
+      <p:par>
+        <p:cTn id="1" dur="indefinite" restart="never" nodeType="tmRoot"/>
+      </p:par>
+    </p:tnLst>
+  </p:timing>
 </p:sld>
 </file>
 
@@ -3476,6 +3582,47 @@
           <a:chExt cx="0" cy="0"/>
         </a:xfrm>
       </p:grpSpPr>
+      <p:pic>
+        <p:nvPicPr>
+          <p:cNvPr id="1026" name="Picture 2" descr="http://puu.sh/odSfD/39daea594d.png"/>
+          <p:cNvPicPr>
+            <a:picLocks noChangeAspect="1" noChangeArrowheads="1"/>
+          </p:cNvPicPr>
+          <p:nvPr/>
+        </p:nvPicPr>
+        <p:blipFill>
+          <a:blip r:embed="rId2">
+            <a:extLst>
+              <a:ext uri="{28A0092B-C50C-407E-A947-70E740481C1C}">
+                <a14:useLocalDpi xmlns:a14="http://schemas.microsoft.com/office/drawing/2010/main" val="0"/>
+              </a:ext>
+            </a:extLst>
+          </a:blip>
+          <a:srcRect/>
+          <a:stretch>
+            <a:fillRect/>
+          </a:stretch>
+        </p:blipFill>
+        <p:spPr bwMode="auto">
+          <a:xfrm>
+            <a:off x="2757962" y="1417638"/>
+            <a:ext cx="6386038" cy="3581400"/>
+          </a:xfrm>
+          <a:prstGeom prst="rect">
+            <a:avLst/>
+          </a:prstGeom>
+          <a:noFill/>
+          <a:extLst>
+            <a:ext uri="{909E8E84-426E-40DD-AFC4-6F175D3DCCD1}">
+              <a14:hiddenFill xmlns:a14="http://schemas.microsoft.com/office/drawing/2010/main">
+                <a:solidFill>
+                  <a:srgbClr val="FFFFFF"/>
+                </a:solidFill>
+              </a14:hiddenFill>
+            </a:ext>
+          </a:extLst>
+        </p:spPr>
+      </p:pic>
       <p:sp>
         <p:nvSpPr>
           <p:cNvPr id="2" name="Title 1"/>
@@ -3488,10 +3635,25 @@
         </p:nvSpPr>
         <p:spPr/>
         <p:txBody>
-          <a:bodyPr/>
-          <a:lstStyle/>
-          <a:p>
-            <a:endParaRPr lang="en-US" dirty="0"/>
+          <a:bodyPr>
+            <a:normAutofit/>
+          </a:bodyPr>
+          <a:lstStyle/>
+          <a:p>
+            <a:pPr algn="l"/>
+            <a:r>
+              <a:rPr lang="en-US" dirty="0" smtClean="0">
+                <a:solidFill>
+                  <a:schemeClr val="bg1"/>
+                </a:solidFill>
+              </a:rPr>
+              <a:t>Some Extras</a:t>
+            </a:r>
+            <a:endParaRPr lang="en-US" dirty="0">
+              <a:solidFill>
+                <a:schemeClr val="bg1"/>
+              </a:solidFill>
+            </a:endParaRPr>
           </a:p>
         </p:txBody>
       </p:sp>
@@ -3510,7 +3672,64 @@
           <a:bodyPr/>
           <a:lstStyle/>
           <a:p>
-            <a:endParaRPr lang="en-US"/>
+            <a:r>
+              <a:rPr lang="en-US" dirty="0" smtClean="0">
+                <a:solidFill>
+                  <a:schemeClr val="bg1"/>
+                </a:solidFill>
+              </a:rPr>
+              <a:t>UI:</a:t>
+            </a:r>
+          </a:p>
+          <a:p>
+            <a:pPr lvl="1"/>
+            <a:r>
+              <a:rPr lang="en-US" dirty="0" smtClean="0">
+                <a:solidFill>
+                  <a:schemeClr val="bg1"/>
+                </a:solidFill>
+              </a:rPr>
+              <a:t>Main Menu</a:t>
+            </a:r>
+          </a:p>
+          <a:p>
+            <a:pPr lvl="1"/>
+            <a:r>
+              <a:rPr lang="en-US" dirty="0" smtClean="0">
+                <a:solidFill>
+                  <a:schemeClr val="bg1"/>
+                </a:solidFill>
+              </a:rPr>
+              <a:t>End Menu</a:t>
+            </a:r>
+          </a:p>
+          <a:p>
+            <a:r>
+              <a:rPr lang="en-US" dirty="0">
+                <a:solidFill>
+                  <a:schemeClr val="bg1"/>
+                </a:solidFill>
+              </a:rPr>
+              <a:t> </a:t>
+            </a:r>
+            <a:r>
+              <a:rPr lang="en-US" dirty="0" smtClean="0">
+                <a:solidFill>
+                  <a:schemeClr val="bg1"/>
+                </a:solidFill>
+              </a:rPr>
+              <a:t>Sounds</a:t>
+            </a:r>
+          </a:p>
+          <a:p>
+            <a:r>
+              <a:rPr lang="en-US" dirty="0" smtClean="0">
+                <a:solidFill>
+                  <a:schemeClr val="bg1"/>
+                </a:solidFill>
+              </a:rPr>
+              <a:t>Animations</a:t>
+            </a:r>
           </a:p>
         </p:txBody>
       </p:sp>
@@ -3524,6 +3743,13 @@
   <p:clrMapOvr>
     <a:masterClrMapping/>
   </p:clrMapOvr>
+  <p:timing>
+    <p:tnLst>
+      <p:par>
+        <p:cTn id="1" dur="indefinite" restart="never" nodeType="tmRoot"/>
+      </p:par>
+    </p:tnLst>
+  </p:timing>
 </p:sld>
 </file>
 

</xml_diff>